<commit_message>
Work on fundamentals.Rmd in data-viz-02
</commit_message>
<xml_diff>
--- a/data-viz-02/component/exercise-first-class-red.pptx
+++ b/data-viz-02/component/exercise-first-class-red.pptx
@@ -12,7 +12,6 @@
     <p:sldId id="260" r:id="rId6"/>
     <p:sldId id="261" r:id="rId7"/>
     <p:sldId id="262" r:id="rId8"/>
-    <p:sldId id="263" r:id="rId9"/>
   </p:sldIdLst>
   <p:sldSz cx="9144000" cy="6858000" type="screen4x3"/>
   <p:notesSz cx="6858000" cy="9144000"/>
@@ -3365,7 +3364,7 @@
             </a:r>
             <a:r>
               <a:rPr/>
-              <a:t>First</a:t>
+              <a:t>Python</a:t>
             </a:r>
             <a:r>
               <a:rPr/>
@@ -3373,31 +3372,7 @@
             </a:r>
             <a:r>
               <a:rPr/>
-              <a:t>class</a:t>
-            </a:r>
-            <a:r>
-              <a:rPr/>
-              <a:t> </a:t>
-            </a:r>
-            <a:r>
-              <a:rPr/>
-              <a:t>red,</a:t>
-            </a:r>
-            <a:r>
-              <a:rPr/>
-              <a:t> </a:t>
-            </a:r>
-            <a:r>
-              <a:rPr/>
-              <a:t>Python</a:t>
-            </a:r>
-            <a:r>
-              <a:rPr/>
-              <a:t> </a:t>
-            </a:r>
-            <a:r>
-              <a:rPr/>
-              <a:t>(1/2)</a:t>
+              <a:t>code</a:t>
             </a:r>
           </a:p>
         </p:txBody>
@@ -3420,7 +3395,7 @@
             <a:pPr lvl="1"/>
             <a:r>
               <a:rPr/>
-              <a:t>Python code</a:t>
+              <a:t>Here’s the Python code</a:t>
             </a:r>
           </a:p>
           <a:p>
@@ -3431,7 +3406,16 @@
               <a:rPr sz="1800">
                 <a:latin typeface="Courier"/>
               </a:rPr>
-              <a:t>((Python code))</a:t>
+              <a:t>ch = alt.Chart(df).mark_bar().encode(
+    alt.Color(
+        'pclass:N',
+        scale=alt.Scale(
+            range=['gray', 'gray', 'red']
+        )
+    ), 
+    x='pclass:N',
+    y='count()'
+)</a:t>
             </a:r>
           </a:p>
         </p:txBody>
@@ -3486,7 +3470,7 @@
             </a:r>
             <a:r>
               <a:rPr/>
-              <a:t>First</a:t>
+              <a:t>Python</a:t>
             </a:r>
             <a:r>
               <a:rPr/>
@@ -3494,7 +3478,67 @@
             </a:r>
             <a:r>
               <a:rPr/>
-              <a:t>class</a:t>
+              <a:t>output</a:t>
+            </a:r>
+          </a:p>
+        </p:txBody>
+      </p:sp>
+      <p:pic>
+        <p:nvPicPr>
+          <p:cNvPr descr="../images/python/red-third-class.png" id="0" name="Picture 1"/>
+          <p:cNvPicPr>
+            <a:picLocks noGrp="1" noChangeAspect="1"/>
+          </p:cNvPicPr>
+          <p:nvPr/>
+        </p:nvPicPr>
+        <p:blipFill>
+          <a:blip r:embed="rId2"/>
+          <a:stretch>
+            <a:fillRect/>
+          </a:stretch>
+        </p:blipFill>
+        <p:spPr bwMode="auto">
+          <a:xfrm>
+            <a:off x="3619500" y="1600200"/>
+            <a:ext cx="1892300" cy="4013200"/>
+          </a:xfrm>
+          <a:prstGeom prst="rect">
+            <a:avLst/>
+          </a:prstGeom>
+          <a:noFill/>
+          <a:ln w="9525">
+            <a:noFill/>
+            <a:headEnd/>
+            <a:tailEnd/>
+          </a:ln>
+        </p:spPr>
+      </p:pic>
+      <p:sp>
+        <p:nvSpPr>
+          <p:cNvPr id="1" name="TextBox 3"/>
+          <p:cNvSpPr txBox="1"/>
+          <p:nvPr/>
+        </p:nvSpPr>
+        <p:spPr>
+          <a:xfrm>
+            <a:off x="457200" y="5613400"/>
+            <a:ext cx="8229600" cy="508000"/>
+          </a:xfrm>
+          <a:prstGeom prst="rect">
+            <a:avLst/>
+          </a:prstGeom>
+          <a:noFill/>
+        </p:spPr>
+        <p:txBody>
+          <a:bodyPr/>
+          <a:lstStyle/>
+          <a:p>
+            <a:pPr lvl="0" marL="0" indent="0" algn="ctr">
+              <a:buNone/>
+            </a:pPr>
+            <a:r>
+              <a:rPr/>
+              <a:t>Bar</a:t>
             </a:r>
             <a:r>
               <a:rPr/>
@@ -3502,7 +3546,7 @@
             </a:r>
             <a:r>
               <a:rPr/>
-              <a:t>red,</a:t>
+              <a:t>chart</a:t>
             </a:r>
             <a:r>
               <a:rPr/>
@@ -3510,7 +3554,7 @@
             </a:r>
             <a:r>
               <a:rPr/>
-              <a:t>Python</a:t>
+              <a:t>with</a:t>
             </a:r>
             <a:r>
               <a:rPr/>
@@ -3518,32 +3562,23 @@
             </a:r>
             <a:r>
               <a:rPr/>
-              <a:t>(2/2)</a:t>
-            </a:r>
-          </a:p>
-        </p:txBody>
-      </p:sp>
-      <p:sp>
-        <p:nvSpPr>
-          <p:cNvPr id="3" name="Content Placeholder 2"/>
-          <p:cNvSpPr>
-            <a:spLocks noGrp="1"/>
-          </p:cNvSpPr>
-          <p:nvPr>
-            <p:ph idx="1"/>
-          </p:nvPr>
-        </p:nvSpPr>
-        <p:spPr/>
-        <p:txBody>
-          <a:bodyPr/>
-          <a:lstStyle/>
-          <a:p>
-            <a:pPr lvl="0" marL="0" indent="0">
-              <a:buNone/>
-            </a:pPr>
-            <a:r>
-              <a:rPr/>
-              <a:t>((Python results))</a:t>
+              <a:t>red</a:t>
+            </a:r>
+            <a:r>
+              <a:rPr/>
+              <a:t> </a:t>
+            </a:r>
+            <a:r>
+              <a:rPr/>
+              <a:t>accent</a:t>
+            </a:r>
+            <a:r>
+              <a:rPr/>
+              <a:t> </a:t>
+            </a:r>
+            <a:r>
+              <a:rPr/>
+              <a:t>color</a:t>
             </a:r>
           </a:p>
         </p:txBody>
@@ -3598,7 +3633,7 @@
             </a:r>
             <a:r>
               <a:rPr/>
-              <a:t>First</a:t>
+              <a:t>R</a:t>
             </a:r>
             <a:r>
               <a:rPr/>
@@ -3606,31 +3641,7 @@
             </a:r>
             <a:r>
               <a:rPr/>
-              <a:t>class</a:t>
-            </a:r>
-            <a:r>
-              <a:rPr/>
-              <a:t> </a:t>
-            </a:r>
-            <a:r>
-              <a:rPr/>
-              <a:t>red,</a:t>
-            </a:r>
-            <a:r>
-              <a:rPr/>
-              <a:t> </a:t>
-            </a:r>
-            <a:r>
-              <a:rPr/>
-              <a:t>R</a:t>
-            </a:r>
-            <a:r>
-              <a:rPr/>
-              <a:t> </a:t>
-            </a:r>
-            <a:r>
-              <a:rPr/>
-              <a:t>(1/2)</a:t>
+              <a:t>code</a:t>
             </a:r>
           </a:p>
         </p:txBody>
@@ -3653,7 +3664,7 @@
             <a:pPr lvl="1"/>
             <a:r>
               <a:rPr/>
-              <a:t>R code</a:t>
+              <a:t>Here’s the R code</a:t>
             </a:r>
           </a:p>
           <a:p>
@@ -3664,7 +3675,9 @@
               <a:rPr sz="1800">
                 <a:latin typeface="Courier"/>
               </a:rPr>
-              <a:t>((R code))</a:t>
+              <a:t>ggplot(titanic, aes(x=pclass, fill=pclass)) +
+  geom_bar() +
+  scale_fill_manual(values=c("darkgrey", "darkgrey", "red"))</a:t>
             </a:r>
           </a:p>
         </p:txBody>
@@ -3719,7 +3732,7 @@
             </a:r>
             <a:r>
               <a:rPr/>
-              <a:t>First</a:t>
+              <a:t>R</a:t>
             </a:r>
             <a:r>
               <a:rPr/>
@@ -3727,56 +3740,67 @@
             </a:r>
             <a:r>
               <a:rPr/>
-              <a:t>class</a:t>
-            </a:r>
-            <a:r>
-              <a:rPr/>
-              <a:t> </a:t>
-            </a:r>
-            <a:r>
-              <a:rPr/>
-              <a:t>red,</a:t>
-            </a:r>
-            <a:r>
-              <a:rPr/>
-              <a:t> </a:t>
-            </a:r>
-            <a:r>
-              <a:rPr/>
-              <a:t>R</a:t>
-            </a:r>
-            <a:r>
-              <a:rPr/>
-              <a:t> </a:t>
-            </a:r>
-            <a:r>
-              <a:rPr/>
-              <a:t>(2/2)</a:t>
-            </a:r>
-          </a:p>
-        </p:txBody>
-      </p:sp>
-      <p:sp>
-        <p:nvSpPr>
-          <p:cNvPr id="3" name="Content Placeholder 2"/>
-          <p:cNvSpPr>
-            <a:spLocks noGrp="1"/>
-          </p:cNvSpPr>
-          <p:nvPr>
-            <p:ph idx="1"/>
-          </p:nvPr>
-        </p:nvSpPr>
-        <p:spPr/>
-        <p:txBody>
-          <a:bodyPr/>
-          <a:lstStyle/>
-          <a:p>
-            <a:pPr lvl="0" marL="0" indent="0">
+              <a:t>output</a:t>
+            </a:r>
+          </a:p>
+        </p:txBody>
+      </p:sp>
+      <p:pic>
+        <p:nvPicPr>
+          <p:cNvPr descr="../images/r/bar-color-repeat.png" id="0" name="Picture 1"/>
+          <p:cNvPicPr>
+            <a:picLocks noGrp="1" noChangeAspect="1"/>
+          </p:cNvPicPr>
+          <p:nvPr/>
+        </p:nvPicPr>
+        <p:blipFill>
+          <a:blip r:embed="rId2"/>
+          <a:stretch>
+            <a:fillRect/>
+          </a:stretch>
+        </p:blipFill>
+        <p:spPr bwMode="auto">
+          <a:xfrm>
+            <a:off x="2565400" y="1600200"/>
+            <a:ext cx="4013200" cy="4013200"/>
+          </a:xfrm>
+          <a:prstGeom prst="rect">
+            <a:avLst/>
+          </a:prstGeom>
+          <a:noFill/>
+          <a:ln w="9525">
+            <a:noFill/>
+            <a:headEnd/>
+            <a:tailEnd/>
+          </a:ln>
+        </p:spPr>
+      </p:pic>
+      <p:sp>
+        <p:nvSpPr>
+          <p:cNvPr id="1" name="TextBox 3"/>
+          <p:cNvSpPr txBox="1"/>
+          <p:nvPr/>
+        </p:nvSpPr>
+        <p:spPr>
+          <a:xfrm>
+            <a:off x="457200" y="5613400"/>
+            <a:ext cx="8229600" cy="508000"/>
+          </a:xfrm>
+          <a:prstGeom prst="rect">
+            <a:avLst/>
+          </a:prstGeom>
+          <a:noFill/>
+        </p:spPr>
+        <p:txBody>
+          <a:bodyPr/>
+          <a:lstStyle/>
+          <a:p>
+            <a:pPr lvl="0" marL="0" indent="0" algn="ctr">
               <a:buNone/>
             </a:pPr>
             <a:r>
               <a:rPr/>
-              <a:t>((R results))</a:t>
+              <a:t>Barchart</a:t>
             </a:r>
           </a:p>
         </p:txBody>
@@ -3831,7 +3855,7 @@
             </a:r>
             <a:r>
               <a:rPr/>
-              <a:t>First</a:t>
+              <a:t>Tableau</a:t>
             </a:r>
             <a:r>
               <a:rPr/>
@@ -3839,143 +3863,7 @@
             </a:r>
             <a:r>
               <a:rPr/>
-              <a:t>class</a:t>
-            </a:r>
-            <a:r>
-              <a:rPr/>
-              <a:t> </a:t>
-            </a:r>
-            <a:r>
-              <a:rPr/>
-              <a:t>red,</a:t>
-            </a:r>
-            <a:r>
-              <a:rPr/>
-              <a:t> </a:t>
-            </a:r>
-            <a:r>
-              <a:rPr/>
-              <a:t>Tableau</a:t>
-            </a:r>
-            <a:r>
-              <a:rPr/>
-              <a:t> </a:t>
-            </a:r>
-            <a:r>
-              <a:rPr/>
-              <a:t>(1/2)</a:t>
-            </a:r>
-          </a:p>
-        </p:txBody>
-      </p:sp>
-      <p:sp>
-        <p:nvSpPr>
-          <p:cNvPr id="3" name="Content Placeholder 2"/>
-          <p:cNvSpPr>
-            <a:spLocks noGrp="1"/>
-          </p:cNvSpPr>
-          <p:nvPr>
-            <p:ph idx="1"/>
-          </p:nvPr>
-        </p:nvSpPr>
-        <p:spPr/>
-        <p:txBody>
-          <a:bodyPr/>
-          <a:lstStyle/>
-          <a:p>
-            <a:pPr lvl="0" marL="0" indent="0">
-              <a:buNone/>
-            </a:pPr>
-            <a:r>
-              <a:rPr/>
-              <a:t>((Tableau steps))</a:t>
-            </a:r>
-          </a:p>
-        </p:txBody>
-      </p:sp>
-    </p:spTree>
-  </p:cSld>
-</p:sld>
-</file>
-
-<file path=ppt/slides/slide8.xml><?xml version="1.0" encoding="utf-8"?>
-<p:sld xmlns:a="http://schemas.openxmlformats.org/drawingml/2006/main" xmlns:r="http://schemas.openxmlformats.org/officeDocument/2006/relationships" xmlns:p="http://schemas.openxmlformats.org/presentationml/2006/main">
-  <p:cSld>
-    <p:spTree>
-      <p:nvGrpSpPr>
-        <p:cNvPr id="1" name=""/>
-        <p:cNvGrpSpPr/>
-        <p:nvPr/>
-      </p:nvGrpSpPr>
-      <p:grpSpPr>
-        <a:xfrm>
-          <a:off x="0" y="0"/>
-          <a:ext cx="0" cy="0"/>
-          <a:chOff x="0" y="0"/>
-          <a:chExt cx="0" cy="0"/>
-        </a:xfrm>
-      </p:grpSpPr>
-      <p:sp>
-        <p:nvSpPr>
-          <p:cNvPr id="2" name="Title 1"/>
-          <p:cNvSpPr>
-            <a:spLocks noGrp="1"/>
-          </p:cNvSpPr>
-          <p:nvPr>
-            <p:ph type="title"/>
-          </p:nvPr>
-        </p:nvSpPr>
-        <p:spPr/>
-        <p:txBody>
-          <a:bodyPr/>
-          <a:lstStyle/>
-          <a:p>
-            <a:pPr lvl="0" marL="0" indent="0">
-              <a:buNone/>
-            </a:pPr>
-            <a:r>
-              <a:rPr/>
-              <a:t>Exercise,</a:t>
-            </a:r>
-            <a:r>
-              <a:rPr/>
-              <a:t> </a:t>
-            </a:r>
-            <a:r>
-              <a:rPr/>
-              <a:t>First</a:t>
-            </a:r>
-            <a:r>
-              <a:rPr/>
-              <a:t> </a:t>
-            </a:r>
-            <a:r>
-              <a:rPr/>
-              <a:t>class</a:t>
-            </a:r>
-            <a:r>
-              <a:rPr/>
-              <a:t> </a:t>
-            </a:r>
-            <a:r>
-              <a:rPr/>
-              <a:t>red,</a:t>
-            </a:r>
-            <a:r>
-              <a:rPr/>
-              <a:t> </a:t>
-            </a:r>
-            <a:r>
-              <a:rPr/>
-              <a:t>Tableau</a:t>
-            </a:r>
-            <a:r>
-              <a:rPr/>
-              <a:t> </a:t>
-            </a:r>
-            <a:r>
-              <a:rPr/>
-              <a:t>(2/2)</a:t>
+              <a:t>output</a:t>
             </a:r>
           </a:p>
         </p:txBody>

</xml_diff>

<commit_message>
Filling in gaps in fundamentals.Rmd in data-viz-02
</commit_message>
<xml_diff>
--- a/data-viz-02/component/exercise-first-class-red.pptx
+++ b/data-viz-02/component/exercise-first-class-red.pptx
@@ -4,6 +4,9 @@
   <p:sldMasterIdLst>
     <p:sldMasterId id="2147483648" r:id="rId1"/>
   </p:sldMasterIdLst>
+  <p:notesMasterIdLst>
+    <p:NotesMasterId r:id="rId9"/>
+  </p:notesMasterIdLst>
   <p:sldIdLst>
     <p:sldId id="256" r:id="rId2"/>
     <p:sldId id="257" r:id="rId3"/>
@@ -127,6 +130,1176 @@
     </p:ext>
   </p:extLst>
 </p:presentation>
+</file>
+
+<file path=ppt/notesMasters/notesMaster1.xml><?xml version="1.0" encoding="utf-8"?>
+<p:notesMaster xmlns:a="http://schemas.openxmlformats.org/drawingml/2006/main" xmlns:r="http://schemas.openxmlformats.org/officeDocument/2006/relationships" xmlns:p="http://schemas.openxmlformats.org/presentationml/2006/main">
+  <p:cSld>
+    <p:bg>
+      <p:bgRef idx="1001">
+        <a:schemeClr val="bg1"/>
+      </p:bgRef>
+    </p:bg>
+    <p:spTree>
+      <p:nvGrpSpPr>
+        <p:cNvPr id="1" name=""/>
+        <p:cNvGrpSpPr/>
+        <p:nvPr/>
+      </p:nvGrpSpPr>
+      <p:grpSpPr>
+        <a:xfrm>
+          <a:off x="0" y="0"/>
+          <a:ext cx="0" cy="0"/>
+          <a:chOff x="0" y="0"/>
+          <a:chExt cx="0" cy="0"/>
+        </a:xfrm>
+      </p:grpSpPr>
+      <p:sp>
+        <p:nvSpPr>
+          <p:cNvPr id="2" name="Header Placeholder 1"/>
+          <p:cNvSpPr>
+            <a:spLocks noGrp="1"/>
+          </p:cNvSpPr>
+          <p:nvPr>
+            <p:ph type="hdr" sz="quarter"/>
+          </p:nvPr>
+        </p:nvSpPr>
+        <p:spPr>
+          <a:xfrm>
+            <a:off x="0" y="0"/>
+            <a:ext cx="2971800" cy="458788"/>
+          </a:xfrm>
+          <a:prstGeom prst="rect">
+            <a:avLst/>
+          </a:prstGeom>
+        </p:spPr>
+        <p:txBody>
+          <a:bodyPr vert="horz" lIns="91440" tIns="45720" rIns="91440" bIns="45720" rtlCol="0"/>
+          <a:lstStyle>
+            <a:lvl1pPr algn="l">
+              <a:defRPr sz="1200"/>
+            </a:lvl1pPr>
+          </a:lstStyle>
+          <a:p>
+            <a:endParaRPr lang="en-US"/>
+          </a:p>
+        </p:txBody>
+      </p:sp>
+      <p:sp>
+        <p:nvSpPr>
+          <p:cNvPr id="3" name="Date Placeholder 2"/>
+          <p:cNvSpPr>
+            <a:spLocks noGrp="1"/>
+          </p:cNvSpPr>
+          <p:nvPr>
+            <p:ph type="dt" idx="1"/>
+          </p:nvPr>
+        </p:nvSpPr>
+        <p:spPr>
+          <a:xfrm>
+            <a:off x="3884613" y="0"/>
+            <a:ext cx="2971800" cy="458788"/>
+          </a:xfrm>
+          <a:prstGeom prst="rect">
+            <a:avLst/>
+          </a:prstGeom>
+        </p:spPr>
+        <p:txBody>
+          <a:bodyPr vert="horz" lIns="91440" tIns="45720" rIns="91440" bIns="45720" rtlCol="0"/>
+          <a:lstStyle>
+            <a:lvl1pPr algn="r">
+              <a:defRPr sz="1200"/>
+            </a:lvl1pPr>
+          </a:lstStyle>
+          <a:p>
+            <a:fld id="{0F9C1CCF-B725-44A7-AA57-5E433BD85C9F}" type="datetimeFigureOut">
+              <a:rPr lang="en-US" smtClean="0"/>
+              <a:t>2/17/2018</a:t>
+            </a:fld>
+            <a:endParaRPr lang="en-US"/>
+          </a:p>
+        </p:txBody>
+      </p:sp>
+      <p:sp>
+        <p:nvSpPr>
+          <p:cNvPr id="4" name="Slide Image Placeholder 3"/>
+          <p:cNvSpPr>
+            <a:spLocks noGrp="1" noRot="1" noChangeAspect="1"/>
+          </p:cNvSpPr>
+          <p:nvPr>
+            <p:ph type="sldImg" idx="2"/>
+          </p:nvPr>
+        </p:nvSpPr>
+        <p:spPr>
+          <a:xfrm>
+            <a:off x="1371600" y="1143000"/>
+            <a:ext cx="4114800" cy="3086100"/>
+          </a:xfrm>
+          <a:prstGeom prst="rect">
+            <a:avLst/>
+          </a:prstGeom>
+          <a:noFill/>
+          <a:ln w="12700">
+            <a:solidFill>
+              <a:prstClr val="black"/>
+            </a:solidFill>
+          </a:ln>
+        </p:spPr>
+        <p:txBody>
+          <a:bodyPr vert="horz" lIns="91440" tIns="45720" rIns="91440" bIns="45720" rtlCol="0" anchor="ctr"/>
+          <a:lstStyle/>
+          <a:p>
+            <a:endParaRPr lang="en-US"/>
+          </a:p>
+        </p:txBody>
+      </p:sp>
+      <p:sp>
+        <p:nvSpPr>
+          <p:cNvPr id="5" name="Notes Placeholder 4"/>
+          <p:cNvSpPr>
+            <a:spLocks noGrp="1"/>
+          </p:cNvSpPr>
+          <p:nvPr>
+            <p:ph type="body" sz="quarter" idx="3"/>
+          </p:nvPr>
+        </p:nvSpPr>
+        <p:spPr>
+          <a:xfrm>
+            <a:off x="685800" y="4400550"/>
+            <a:ext cx="5486400" cy="3600450"/>
+          </a:xfrm>
+          <a:prstGeom prst="rect">
+            <a:avLst/>
+          </a:prstGeom>
+        </p:spPr>
+        <p:txBody>
+          <a:bodyPr vert="horz" lIns="91440" tIns="45720" rIns="91440" bIns="45720" rtlCol="0"/>
+          <a:lstStyle/>
+          <a:p>
+            <a:pPr lvl="0"/>
+            <a:r>
+              <a:rPr lang="en-US" smtClean="0"/>
+              <a:t>Click to edit Master text styles</a:t>
+            </a:r>
+          </a:p>
+          <a:p>
+            <a:pPr lvl="1"/>
+            <a:r>
+              <a:rPr lang="en-US" smtClean="0"/>
+              <a:t>Second level</a:t>
+            </a:r>
+          </a:p>
+          <a:p>
+            <a:pPr lvl="2"/>
+            <a:r>
+              <a:rPr lang="en-US" smtClean="0"/>
+              <a:t>Third level</a:t>
+            </a:r>
+          </a:p>
+          <a:p>
+            <a:pPr lvl="3"/>
+            <a:r>
+              <a:rPr lang="en-US" smtClean="0"/>
+              <a:t>Fourth level</a:t>
+            </a:r>
+          </a:p>
+          <a:p>
+            <a:pPr lvl="4"/>
+            <a:r>
+              <a:rPr lang="en-US" smtClean="0"/>
+              <a:t>Fifth level</a:t>
+            </a:r>
+            <a:endParaRPr lang="en-US"/>
+          </a:p>
+        </p:txBody>
+      </p:sp>
+      <p:sp>
+        <p:nvSpPr>
+          <p:cNvPr id="6" name="Footer Placeholder 5"/>
+          <p:cNvSpPr>
+            <a:spLocks noGrp="1"/>
+          </p:cNvSpPr>
+          <p:nvPr>
+            <p:ph type="ftr" sz="quarter" idx="4"/>
+          </p:nvPr>
+        </p:nvSpPr>
+        <p:spPr>
+          <a:xfrm>
+            <a:off x="0" y="8685213"/>
+            <a:ext cx="2971800" cy="458787"/>
+          </a:xfrm>
+          <a:prstGeom prst="rect">
+            <a:avLst/>
+          </a:prstGeom>
+        </p:spPr>
+        <p:txBody>
+          <a:bodyPr vert="horz" lIns="91440" tIns="45720" rIns="91440" bIns="45720" rtlCol="0" anchor="b"/>
+          <a:lstStyle>
+            <a:lvl1pPr algn="l">
+              <a:defRPr sz="1200"/>
+            </a:lvl1pPr>
+          </a:lstStyle>
+          <a:p>
+            <a:endParaRPr lang="en-US"/>
+          </a:p>
+        </p:txBody>
+      </p:sp>
+      <p:sp>
+        <p:nvSpPr>
+          <p:cNvPr id="7" name="Slide Number Placeholder 6"/>
+          <p:cNvSpPr>
+            <a:spLocks noGrp="1"/>
+          </p:cNvSpPr>
+          <p:nvPr>
+            <p:ph type="sldNum" sz="quarter" idx="5"/>
+          </p:nvPr>
+        </p:nvSpPr>
+        <p:spPr>
+          <a:xfrm>
+            <a:off x="3884613" y="8685213"/>
+            <a:ext cx="2971800" cy="458787"/>
+          </a:xfrm>
+          <a:prstGeom prst="rect">
+            <a:avLst/>
+          </a:prstGeom>
+        </p:spPr>
+        <p:txBody>
+          <a:bodyPr vert="horz" lIns="91440" tIns="45720" rIns="91440" bIns="45720" rtlCol="0" anchor="b"/>
+          <a:lstStyle>
+            <a:lvl1pPr algn="r">
+              <a:defRPr sz="1200"/>
+            </a:lvl1pPr>
+          </a:lstStyle>
+          <a:p>
+            <a:fld id="{18BDFEC3-8487-43E8-A154-7C12CBC1FFF2}" type="slidenum">
+              <a:rPr lang="en-US" smtClean="0"/>
+              <a:t>‹#›</a:t>
+            </a:fld>
+            <a:endParaRPr lang="en-US"/>
+          </a:p>
+        </p:txBody>
+      </p:sp>
+    </p:spTree>
+    <p:extLst>
+      <p:ext uri="{BB962C8B-B14F-4D97-AF65-F5344CB8AC3E}">
+        <p14:creationId xmlns:p14="http://schemas.microsoft.com/office/powerpoint/2010/main" val="3782709779"/>
+      </p:ext>
+    </p:extLst>
+  </p:cSld>
+  <p:clrMap bg1="lt1" tx1="dk1" bg2="lt2" tx2="dk2" accent1="accent1" accent2="accent2" accent3="accent3" accent4="accent4" accent5="accent5" accent6="accent6" hlink="hlink" folHlink="folHlink"/>
+  <p:notesStyle>
+    <a:lvl1pPr marL="0" algn="l" defTabSz="914400" rtl="0" eaLnBrk="1" latinLnBrk="0" hangingPunct="1">
+      <a:defRPr sz="1200" kern="1200">
+        <a:solidFill>
+          <a:schemeClr val="tx1"/>
+        </a:solidFill>
+        <a:latin typeface="+mn-lt"/>
+        <a:ea typeface="+mn-ea"/>
+        <a:cs typeface="+mn-cs"/>
+      </a:defRPr>
+    </a:lvl1pPr>
+    <a:lvl2pPr marL="457200" algn="l" defTabSz="914400" rtl="0" eaLnBrk="1" latinLnBrk="0" hangingPunct="1">
+      <a:defRPr sz="1200" kern="1200">
+        <a:solidFill>
+          <a:schemeClr val="tx1"/>
+        </a:solidFill>
+        <a:latin typeface="+mn-lt"/>
+        <a:ea typeface="+mn-ea"/>
+        <a:cs typeface="+mn-cs"/>
+      </a:defRPr>
+    </a:lvl2pPr>
+    <a:lvl3pPr marL="914400" algn="l" defTabSz="914400" rtl="0" eaLnBrk="1" latinLnBrk="0" hangingPunct="1">
+      <a:defRPr sz="1200" kern="1200">
+        <a:solidFill>
+          <a:schemeClr val="tx1"/>
+        </a:solidFill>
+        <a:latin typeface="+mn-lt"/>
+        <a:ea typeface="+mn-ea"/>
+        <a:cs typeface="+mn-cs"/>
+      </a:defRPr>
+    </a:lvl3pPr>
+    <a:lvl4pPr marL="1371600" algn="l" defTabSz="914400" rtl="0" eaLnBrk="1" latinLnBrk="0" hangingPunct="1">
+      <a:defRPr sz="1200" kern="1200">
+        <a:solidFill>
+          <a:schemeClr val="tx1"/>
+        </a:solidFill>
+        <a:latin typeface="+mn-lt"/>
+        <a:ea typeface="+mn-ea"/>
+        <a:cs typeface="+mn-cs"/>
+      </a:defRPr>
+    </a:lvl4pPr>
+    <a:lvl5pPr marL="1828800" algn="l" defTabSz="914400" rtl="0" eaLnBrk="1" latinLnBrk="0" hangingPunct="1">
+      <a:defRPr sz="1200" kern="1200">
+        <a:solidFill>
+          <a:schemeClr val="tx1"/>
+        </a:solidFill>
+        <a:latin typeface="+mn-lt"/>
+        <a:ea typeface="+mn-ea"/>
+        <a:cs typeface="+mn-cs"/>
+      </a:defRPr>
+    </a:lvl5pPr>
+    <a:lvl6pPr marL="2286000" algn="l" defTabSz="914400" rtl="0" eaLnBrk="1" latinLnBrk="0" hangingPunct="1">
+      <a:defRPr sz="1200" kern="1200">
+        <a:solidFill>
+          <a:schemeClr val="tx1"/>
+        </a:solidFill>
+        <a:latin typeface="+mn-lt"/>
+        <a:ea typeface="+mn-ea"/>
+        <a:cs typeface="+mn-cs"/>
+      </a:defRPr>
+    </a:lvl6pPr>
+    <a:lvl7pPr marL="2743200" algn="l" defTabSz="914400" rtl="0" eaLnBrk="1" latinLnBrk="0" hangingPunct="1">
+      <a:defRPr sz="1200" kern="1200">
+        <a:solidFill>
+          <a:schemeClr val="tx1"/>
+        </a:solidFill>
+        <a:latin typeface="+mn-lt"/>
+        <a:ea typeface="+mn-ea"/>
+        <a:cs typeface="+mn-cs"/>
+      </a:defRPr>
+    </a:lvl7pPr>
+    <a:lvl8pPr marL="3200400" algn="l" defTabSz="914400" rtl="0" eaLnBrk="1" latinLnBrk="0" hangingPunct="1">
+      <a:defRPr sz="1200" kern="1200">
+        <a:solidFill>
+          <a:schemeClr val="tx1"/>
+        </a:solidFill>
+        <a:latin typeface="+mn-lt"/>
+        <a:ea typeface="+mn-ea"/>
+        <a:cs typeface="+mn-cs"/>
+      </a:defRPr>
+    </a:lvl8pPr>
+    <a:lvl9pPr marL="3657600" algn="l" defTabSz="914400" rtl="0" eaLnBrk="1" latinLnBrk="0" hangingPunct="1">
+      <a:defRPr sz="1200" kern="1200">
+        <a:solidFill>
+          <a:schemeClr val="tx1"/>
+        </a:solidFill>
+        <a:latin typeface="+mn-lt"/>
+        <a:ea typeface="+mn-ea"/>
+        <a:cs typeface="+mn-cs"/>
+      </a:defRPr>
+    </a:lvl9pPr>
+  </p:notesStyle>
+</p:notesMaster>
+</file>
+
+<file path=ppt/notesSlides/notesSlide1.xml><?xml version="1.0" encoding="utf-8"?>
+<p:notes xmlns:a="http://schemas.openxmlformats.org/drawingml/2006/main" xmlns:r="http://schemas.openxmlformats.org/officeDocument/2006/relationships" xmlns:p="http://schemas.openxmlformats.org/presentationml/2006/main">
+  <p:cSld>
+    <p:spTree>
+      <p:nvGrpSpPr>
+        <p:cNvPr id="1" name=""/>
+        <p:cNvGrpSpPr/>
+        <p:nvPr/>
+      </p:nvGrpSpPr>
+      <p:grpSpPr>
+        <a:xfrm>
+          <a:off x="0" y="0"/>
+          <a:ext cx="0" cy="0"/>
+          <a:chOff x="0" y="0"/>
+          <a:chExt cx="0" cy="0"/>
+        </a:xfrm>
+      </p:grpSpPr>
+      <p:sp>
+        <p:nvSpPr>
+          <p:cNvPr id="2" name="Slide Image Placeholder 1"/>
+          <p:cNvSpPr>
+            <a:spLocks noGrp="1" noRot="1" noChangeAspect="1"/>
+          </p:cNvSpPr>
+          <p:nvPr>
+            <p:ph type="sldImg"/>
+          </p:nvPr>
+        </p:nvSpPr>
+        <p:spPr/>
+      </p:sp>
+      <p:sp>
+        <p:nvSpPr>
+          <p:cNvPr id="3" name="Notes Placeholder 2"/>
+          <p:cNvSpPr>
+            <a:spLocks noGrp="1"/>
+          </p:cNvSpPr>
+          <p:nvPr>
+            <p:ph type="body" idx="1"/>
+          </p:nvPr>
+        </p:nvSpPr>
+        <p:spPr/>
+        <p:txBody>
+          <a:bodyPr/>
+          <a:lstStyle/>
+          <a:p>
+            <a:pPr lvl="0" marL="0" indent="0">
+              <a:buNone/>
+            </a:pPr>
+            <a:r>
+              <a:rPr/>
+              <a:t>One</a:t>
+            </a:r>
+            <a:r>
+              <a:rPr/>
+              <a:t> </a:t>
+            </a:r>
+            <a:r>
+              <a:rPr/>
+              <a:t>way</a:t>
+            </a:r>
+            <a:r>
+              <a:rPr/>
+              <a:t> </a:t>
+            </a:r>
+            <a:r>
+              <a:rPr/>
+              <a:t>to</a:t>
+            </a:r>
+            <a:r>
+              <a:rPr/>
+              <a:t> </a:t>
+            </a:r>
+            <a:r>
+              <a:rPr/>
+              <a:t>emphasize</a:t>
+            </a:r>
+            <a:r>
+              <a:rPr/>
+              <a:t> </a:t>
+            </a:r>
+            <a:r>
+              <a:rPr/>
+              <a:t>a</a:t>
+            </a:r>
+            <a:r>
+              <a:rPr/>
+              <a:t> </a:t>
+            </a:r>
+            <a:r>
+              <a:rPr/>
+              <a:t>particular</a:t>
+            </a:r>
+            <a:r>
+              <a:rPr/>
+              <a:t> </a:t>
+            </a:r>
+            <a:r>
+              <a:rPr/>
+              <a:t>category</a:t>
+            </a:r>
+            <a:r>
+              <a:rPr/>
+              <a:t> </a:t>
+            </a:r>
+            <a:r>
+              <a:rPr/>
+              <a:t>is</a:t>
+            </a:r>
+            <a:r>
+              <a:rPr/>
+              <a:t> </a:t>
+            </a:r>
+            <a:r>
+              <a:rPr/>
+              <a:t>to</a:t>
+            </a:r>
+            <a:r>
+              <a:rPr/>
+              <a:t> </a:t>
+            </a:r>
+            <a:r>
+              <a:rPr/>
+              <a:t>make</a:t>
+            </a:r>
+            <a:r>
+              <a:rPr/>
+              <a:t> </a:t>
+            </a:r>
+            <a:r>
+              <a:rPr/>
+              <a:t>it</a:t>
+            </a:r>
+            <a:r>
+              <a:rPr/>
+              <a:t> </a:t>
+            </a:r>
+            <a:r>
+              <a:rPr/>
+              <a:t>a</a:t>
+            </a:r>
+            <a:r>
+              <a:rPr/>
+              <a:t> </a:t>
+            </a:r>
+            <a:r>
+              <a:rPr/>
+              <a:t>bright</a:t>
+            </a:r>
+            <a:r>
+              <a:rPr/>
+              <a:t> </a:t>
+            </a:r>
+            <a:r>
+              <a:rPr/>
+              <a:t>color</a:t>
+            </a:r>
+            <a:r>
+              <a:rPr/>
+              <a:t> </a:t>
+            </a:r>
+            <a:r>
+              <a:rPr/>
+              <a:t>and</a:t>
+            </a:r>
+            <a:r>
+              <a:rPr/>
+              <a:t> </a:t>
+            </a:r>
+            <a:r>
+              <a:rPr/>
+              <a:t>to</a:t>
+            </a:r>
+            <a:r>
+              <a:rPr/>
+              <a:t> </a:t>
+            </a:r>
+            <a:r>
+              <a:rPr/>
+              <a:t>set</a:t>
+            </a:r>
+            <a:r>
+              <a:rPr/>
+              <a:t> </a:t>
+            </a:r>
+            <a:r>
+              <a:rPr/>
+              <a:t>the</a:t>
+            </a:r>
+            <a:r>
+              <a:rPr/>
+              <a:t> </a:t>
+            </a:r>
+            <a:r>
+              <a:rPr/>
+              <a:t>other</a:t>
+            </a:r>
+            <a:r>
+              <a:rPr/>
+              <a:t> </a:t>
+            </a:r>
+            <a:r>
+              <a:rPr/>
+              <a:t>colors</a:t>
+            </a:r>
+            <a:r>
+              <a:rPr/>
+              <a:t> </a:t>
+            </a:r>
+            <a:r>
+              <a:rPr/>
+              <a:t>to</a:t>
+            </a:r>
+            <a:r>
+              <a:rPr/>
+              <a:t> </a:t>
+            </a:r>
+            <a:r>
+              <a:rPr/>
+              <a:t>a</a:t>
+            </a:r>
+            <a:r>
+              <a:rPr/>
+              <a:t> </a:t>
+            </a:r>
+            <a:r>
+              <a:rPr/>
+              <a:t>less</a:t>
+            </a:r>
+            <a:r>
+              <a:rPr/>
+              <a:t> </a:t>
+            </a:r>
+            <a:r>
+              <a:rPr/>
+              <a:t>prominent</a:t>
+            </a:r>
+            <a:r>
+              <a:rPr/>
+              <a:t> </a:t>
+            </a:r>
+            <a:r>
+              <a:rPr/>
+              <a:t>color</a:t>
+            </a:r>
+            <a:r>
+              <a:rPr/>
+              <a:t> </a:t>
+            </a:r>
+            <a:r>
+              <a:rPr/>
+              <a:t>like</a:t>
+            </a:r>
+            <a:r>
+              <a:rPr/>
+              <a:t> </a:t>
+            </a:r>
+            <a:r>
+              <a:rPr/>
+              <a:t>gray</a:t>
+            </a:r>
+            <a:r>
+              <a:rPr/>
+              <a:t> </a:t>
+            </a:r>
+            <a:r>
+              <a:rPr/>
+              <a:t>that</a:t>
+            </a:r>
+            <a:r>
+              <a:rPr/>
+              <a:t> </a:t>
+            </a:r>
+            <a:r>
+              <a:rPr/>
+              <a:t>lets</a:t>
+            </a:r>
+            <a:r>
+              <a:rPr/>
+              <a:t> </a:t>
+            </a:r>
+            <a:r>
+              <a:rPr/>
+              <a:t>them</a:t>
+            </a:r>
+            <a:r>
+              <a:rPr/>
+              <a:t> </a:t>
+            </a:r>
+            <a:r>
+              <a:rPr/>
+              <a:t>fade</a:t>
+            </a:r>
+            <a:r>
+              <a:rPr/>
+              <a:t> </a:t>
+            </a:r>
+            <a:r>
+              <a:rPr/>
+              <a:t>into</a:t>
+            </a:r>
+            <a:r>
+              <a:rPr/>
+              <a:t> </a:t>
+            </a:r>
+            <a:r>
+              <a:rPr/>
+              <a:t>the</a:t>
+            </a:r>
+            <a:r>
+              <a:rPr/>
+              <a:t> </a:t>
+            </a:r>
+            <a:r>
+              <a:rPr/>
+              <a:t>background.</a:t>
+            </a:r>
+            <a:r>
+              <a:rPr/>
+              <a:t> </a:t>
+            </a:r>
+            <a:r>
+              <a:rPr/>
+              <a:t>It’s</a:t>
+            </a:r>
+            <a:r>
+              <a:rPr/>
+              <a:t> </a:t>
+            </a:r>
+            <a:r>
+              <a:rPr/>
+              <a:t>okay</a:t>
+            </a:r>
+            <a:r>
+              <a:rPr/>
+              <a:t> </a:t>
+            </a:r>
+            <a:r>
+              <a:rPr/>
+              <a:t>to</a:t>
+            </a:r>
+            <a:r>
+              <a:rPr/>
+              <a:t> </a:t>
+            </a:r>
+            <a:r>
+              <a:rPr/>
+              <a:t>use</a:t>
+            </a:r>
+            <a:r>
+              <a:rPr/>
+              <a:t> </a:t>
+            </a:r>
+            <a:r>
+              <a:rPr/>
+              <a:t>the</a:t>
+            </a:r>
+            <a:r>
+              <a:rPr/>
+              <a:t> </a:t>
+            </a:r>
+            <a:r>
+              <a:rPr/>
+              <a:t>same</a:t>
+            </a:r>
+            <a:r>
+              <a:rPr/>
+              <a:t> </a:t>
+            </a:r>
+            <a:r>
+              <a:rPr/>
+              <a:t>color</a:t>
+            </a:r>
+            <a:r>
+              <a:rPr/>
+              <a:t> </a:t>
+            </a:r>
+            <a:r>
+              <a:rPr/>
+              <a:t>for</a:t>
+            </a:r>
+            <a:r>
+              <a:rPr/>
+              <a:t> </a:t>
+            </a:r>
+            <a:r>
+              <a:rPr/>
+              <a:t>more</a:t>
+            </a:r>
+            <a:r>
+              <a:rPr/>
+              <a:t> </a:t>
+            </a:r>
+            <a:r>
+              <a:rPr/>
+              <a:t>than</a:t>
+            </a:r>
+            <a:r>
+              <a:rPr/>
+              <a:t> </a:t>
+            </a:r>
+            <a:r>
+              <a:rPr/>
+              <a:t>one</a:t>
+            </a:r>
+            <a:r>
+              <a:rPr/>
+              <a:t> </a:t>
+            </a:r>
+            <a:r>
+              <a:rPr/>
+              <a:t>category.</a:t>
+            </a:r>
+          </a:p>
+          <a:p>
+            <a:pPr lvl="0" marL="0" indent="0">
+              <a:buNone/>
+            </a:pPr>
+          </a:p>
+          <a:p>
+            <a:pPr lvl="0" marL="0" indent="0">
+              <a:buNone/>
+            </a:pPr>
+            <a:r>
+              <a:rPr/>
+              <a:t>Make</a:t>
+            </a:r>
+            <a:r>
+              <a:rPr/>
+              <a:t> </a:t>
+            </a:r>
+            <a:r>
+              <a:rPr/>
+              <a:t>the</a:t>
+            </a:r>
+            <a:r>
+              <a:rPr/>
+              <a:t> </a:t>
+            </a:r>
+            <a:r>
+              <a:rPr/>
+              <a:t>first</a:t>
+            </a:r>
+            <a:r>
+              <a:rPr/>
+              <a:t> </a:t>
+            </a:r>
+            <a:r>
+              <a:rPr/>
+              <a:t>class</a:t>
+            </a:r>
+            <a:r>
+              <a:rPr/>
+              <a:t> </a:t>
+            </a:r>
+            <a:r>
+              <a:rPr/>
+              <a:t>category</a:t>
+            </a:r>
+            <a:r>
+              <a:rPr/>
+              <a:t> </a:t>
+            </a:r>
+            <a:r>
+              <a:rPr/>
+              <a:t>red</a:t>
+            </a:r>
+            <a:r>
+              <a:rPr/>
+              <a:t> </a:t>
+            </a:r>
+            <a:r>
+              <a:rPr/>
+              <a:t>and</a:t>
+            </a:r>
+            <a:r>
+              <a:rPr/>
+              <a:t> </a:t>
+            </a:r>
+            <a:r>
+              <a:rPr/>
+              <a:t>set</a:t>
+            </a:r>
+            <a:r>
+              <a:rPr/>
+              <a:t> </a:t>
+            </a:r>
+            <a:r>
+              <a:rPr/>
+              <a:t>the</a:t>
+            </a:r>
+            <a:r>
+              <a:rPr/>
+              <a:t> </a:t>
+            </a:r>
+            <a:r>
+              <a:rPr/>
+              <a:t>second</a:t>
+            </a:r>
+            <a:r>
+              <a:rPr/>
+              <a:t> </a:t>
+            </a:r>
+            <a:r>
+              <a:rPr/>
+              <a:t>and</a:t>
+            </a:r>
+            <a:r>
+              <a:rPr/>
+              <a:t> </a:t>
+            </a:r>
+            <a:r>
+              <a:rPr/>
+              <a:t>third</a:t>
+            </a:r>
+            <a:r>
+              <a:rPr/>
+              <a:t> </a:t>
+            </a:r>
+            <a:r>
+              <a:rPr/>
+              <a:t>class</a:t>
+            </a:r>
+            <a:r>
+              <a:rPr/>
+              <a:t> </a:t>
+            </a:r>
+            <a:r>
+              <a:rPr/>
+              <a:t>categories</a:t>
+            </a:r>
+            <a:r>
+              <a:rPr/>
+              <a:t> </a:t>
+            </a:r>
+            <a:r>
+              <a:rPr/>
+              <a:t>to</a:t>
+            </a:r>
+            <a:r>
+              <a:rPr/>
+              <a:t> </a:t>
+            </a:r>
+            <a:r>
+              <a:rPr/>
+              <a:t>gray.</a:t>
+            </a:r>
+          </a:p>
+        </p:txBody>
+      </p:sp>
+      <p:sp>
+        <p:nvSpPr>
+          <p:cNvPr id="4" name="Slide Number Placeholder 3"/>
+          <p:cNvSpPr>
+            <a:spLocks noGrp="1"/>
+          </p:cNvSpPr>
+          <p:nvPr>
+            <p:ph type="sldNum" sz="quarter" idx="10"/>
+          </p:nvPr>
+        </p:nvSpPr>
+        <p:spPr/>
+        <p:txBody>
+          <a:bodyPr/>
+          <a:lstStyle/>
+          <a:p>
+            <a:fld id="{18BDFEC3-8487-43E8-A154-7C12CBC1FFF2}" type="slidenum">
+              <a:rPr lang="en-US"/>
+              <a:t>2</a:t>
+            </a:fld>
+            <a:endParaRPr lang="en-US"/>
+          </a:p>
+        </p:txBody>
+      </p:sp>
+    </p:spTree>
+  </p:cSld>
+</p:notes>
+</file>
+
+<file path=ppt/notesSlides/notesSlide2.xml><?xml version="1.0" encoding="utf-8"?>
+<p:notes xmlns:a="http://schemas.openxmlformats.org/drawingml/2006/main" xmlns:r="http://schemas.openxmlformats.org/officeDocument/2006/relationships" xmlns:p="http://schemas.openxmlformats.org/presentationml/2006/main">
+  <p:cSld>
+    <p:spTree>
+      <p:nvGrpSpPr>
+        <p:cNvPr id="1" name=""/>
+        <p:cNvGrpSpPr/>
+        <p:nvPr/>
+      </p:nvGrpSpPr>
+      <p:grpSpPr>
+        <a:xfrm>
+          <a:off x="0" y="0"/>
+          <a:ext cx="0" cy="0"/>
+          <a:chOff x="0" y="0"/>
+          <a:chExt cx="0" cy="0"/>
+        </a:xfrm>
+      </p:grpSpPr>
+      <p:sp>
+        <p:nvSpPr>
+          <p:cNvPr id="2" name="Slide Image Placeholder 1"/>
+          <p:cNvSpPr>
+            <a:spLocks noGrp="1" noRot="1" noChangeAspect="1"/>
+          </p:cNvSpPr>
+          <p:nvPr>
+            <p:ph type="sldImg"/>
+          </p:nvPr>
+        </p:nvSpPr>
+        <p:spPr/>
+      </p:sp>
+      <p:sp>
+        <p:nvSpPr>
+          <p:cNvPr id="3" name="Notes Placeholder 2"/>
+          <p:cNvSpPr>
+            <a:spLocks noGrp="1"/>
+          </p:cNvSpPr>
+          <p:nvPr>
+            <p:ph type="body" idx="1"/>
+          </p:nvPr>
+        </p:nvSpPr>
+        <p:spPr/>
+        <p:txBody>
+          <a:bodyPr/>
+          <a:lstStyle/>
+          <a:p>
+            <a:pPr lvl="0" marL="0" indent="0">
+              <a:buNone/>
+            </a:pPr>
+            <a:r>
+              <a:rPr/>
+              <a:t>Here</a:t>
+            </a:r>
+            <a:r>
+              <a:rPr/>
+              <a:t> </a:t>
+            </a:r>
+            <a:r>
+              <a:rPr/>
+              <a:t>is</a:t>
+            </a:r>
+            <a:r>
+              <a:rPr/>
+              <a:t> </a:t>
+            </a:r>
+            <a:r>
+              <a:rPr/>
+              <a:t>the</a:t>
+            </a:r>
+            <a:r>
+              <a:rPr/>
+              <a:t> </a:t>
+            </a:r>
+            <a:r>
+              <a:rPr/>
+              <a:t>graph</a:t>
+            </a:r>
+            <a:r>
+              <a:rPr/>
+              <a:t> </a:t>
+            </a:r>
+            <a:r>
+              <a:rPr/>
+              <a:t>in</a:t>
+            </a:r>
+            <a:r>
+              <a:rPr/>
+              <a:t> </a:t>
+            </a:r>
+            <a:r>
+              <a:rPr/>
+              <a:t>Python.</a:t>
+            </a:r>
+          </a:p>
+        </p:txBody>
+      </p:sp>
+      <p:sp>
+        <p:nvSpPr>
+          <p:cNvPr id="4" name="Slide Number Placeholder 3"/>
+          <p:cNvSpPr>
+            <a:spLocks noGrp="1"/>
+          </p:cNvSpPr>
+          <p:nvPr>
+            <p:ph type="sldNum" sz="quarter" idx="10"/>
+          </p:nvPr>
+        </p:nvSpPr>
+        <p:spPr/>
+        <p:txBody>
+          <a:bodyPr/>
+          <a:lstStyle/>
+          <a:p>
+            <a:fld id="{18BDFEC3-8487-43E8-A154-7C12CBC1FFF2}" type="slidenum">
+              <a:rPr lang="en-US"/>
+              <a:t>5</a:t>
+            </a:fld>
+            <a:endParaRPr lang="en-US"/>
+          </a:p>
+        </p:txBody>
+      </p:sp>
+    </p:spTree>
+  </p:cSld>
+</p:notes>
+</file>
+
+<file path=ppt/notesSlides/notesSlide3.xml><?xml version="1.0" encoding="utf-8"?>
+<p:notes xmlns:a="http://schemas.openxmlformats.org/drawingml/2006/main" xmlns:r="http://schemas.openxmlformats.org/officeDocument/2006/relationships" xmlns:p="http://schemas.openxmlformats.org/presentationml/2006/main">
+  <p:cSld>
+    <p:spTree>
+      <p:nvGrpSpPr>
+        <p:cNvPr id="1" name=""/>
+        <p:cNvGrpSpPr/>
+        <p:nvPr/>
+      </p:nvGrpSpPr>
+      <p:grpSpPr>
+        <a:xfrm>
+          <a:off x="0" y="0"/>
+          <a:ext cx="0" cy="0"/>
+          <a:chOff x="0" y="0"/>
+          <a:chExt cx="0" cy="0"/>
+        </a:xfrm>
+      </p:grpSpPr>
+      <p:sp>
+        <p:nvSpPr>
+          <p:cNvPr id="2" name="Slide Image Placeholder 1"/>
+          <p:cNvSpPr>
+            <a:spLocks noGrp="1" noRot="1" noChangeAspect="1"/>
+          </p:cNvSpPr>
+          <p:nvPr>
+            <p:ph type="sldImg"/>
+          </p:nvPr>
+        </p:nvSpPr>
+        <p:spPr/>
+      </p:sp>
+      <p:sp>
+        <p:nvSpPr>
+          <p:cNvPr id="3" name="Notes Placeholder 2"/>
+          <p:cNvSpPr>
+            <a:spLocks noGrp="1"/>
+          </p:cNvSpPr>
+          <p:nvPr>
+            <p:ph type="body" idx="1"/>
+          </p:nvPr>
+        </p:nvSpPr>
+        <p:spPr/>
+        <p:txBody>
+          <a:bodyPr/>
+          <a:lstStyle/>
+          <a:p>
+            <a:pPr lvl="0" marL="0" indent="0">
+              <a:buNone/>
+            </a:pPr>
+            <a:r>
+              <a:rPr/>
+              <a:t>Here</a:t>
+            </a:r>
+            <a:r>
+              <a:rPr/>
+              <a:t> </a:t>
+            </a:r>
+            <a:r>
+              <a:rPr/>
+              <a:t>is</a:t>
+            </a:r>
+            <a:r>
+              <a:rPr/>
+              <a:t> </a:t>
+            </a:r>
+            <a:r>
+              <a:rPr/>
+              <a:t>the</a:t>
+            </a:r>
+            <a:r>
+              <a:rPr/>
+              <a:t> </a:t>
+            </a:r>
+            <a:r>
+              <a:rPr/>
+              <a:t>graph</a:t>
+            </a:r>
+            <a:r>
+              <a:rPr/>
+              <a:t> </a:t>
+            </a:r>
+            <a:r>
+              <a:rPr/>
+              <a:t>in</a:t>
+            </a:r>
+            <a:r>
+              <a:rPr/>
+              <a:t> </a:t>
+            </a:r>
+            <a:r>
+              <a:rPr/>
+              <a:t>R.</a:t>
+            </a:r>
+          </a:p>
+        </p:txBody>
+      </p:sp>
+      <p:sp>
+        <p:nvSpPr>
+          <p:cNvPr id="4" name="Slide Number Placeholder 3"/>
+          <p:cNvSpPr>
+            <a:spLocks noGrp="1"/>
+          </p:cNvSpPr>
+          <p:nvPr>
+            <p:ph type="sldNum" sz="quarter" idx="10"/>
+          </p:nvPr>
+        </p:nvSpPr>
+        <p:spPr/>
+        <p:txBody>
+          <a:bodyPr/>
+          <a:lstStyle/>
+          <a:p>
+            <a:fld id="{18BDFEC3-8487-43E8-A154-7C12CBC1FFF2}" type="slidenum">
+              <a:rPr lang="en-US"/>
+              <a:t>6</a:t>
+            </a:fld>
+            <a:endParaRPr lang="en-US"/>
+          </a:p>
+        </p:txBody>
+      </p:sp>
+    </p:spTree>
+  </p:cSld>
+</p:notes>
 </file>
 
 <file path=ppt/slideLayouts/slideLayout1.xml><?xml version="1.0" encoding="utf-8"?>
@@ -3309,7 +4482,14 @@
             <a:pPr lvl="1"/>
             <a:r>
               <a:rPr/>
-              <a:t>Make the first class bar red to show Leonardo di Caprio’s perspective on the Titanic.</a:t>
+              <a:t>Make the first class bar red (#FF0000)</a:t>
+            </a:r>
+          </a:p>
+          <a:p>
+            <a:pPr lvl="1"/>
+            <a:r>
+              <a:rPr/>
+              <a:t>Make the other two bars gray (#808080)</a:t>
             </a:r>
           </a:p>
         </p:txBody>
@@ -3410,7 +4590,7 @@
     alt.Color(
         'pclass:N',
         scale=alt.Scale(
-            range=['gray', 'gray', 'red']
+            range=['#FF0000', '#808080', '#808080']
         )
     ), 
     x='pclass:N',
@@ -3485,7 +4665,7 @@
       </p:sp>
       <p:pic>
         <p:nvPicPr>
-          <p:cNvPr descr="../images/python/red-third-class.png" id="0" name="Picture 1"/>
+          <p:cNvPr descr="../images/python/red-first-class.png" id="0" name="Picture 1"/>
           <p:cNvPicPr>
             <a:picLocks noGrp="1" noChangeAspect="1"/>
           </p:cNvPicPr>
@@ -3500,7 +4680,7 @@
         <p:spPr bwMode="auto">
           <a:xfrm>
             <a:off x="3619500" y="1600200"/>
-            <a:ext cx="1892300" cy="4013200"/>
+            <a:ext cx="1917700" cy="4013200"/>
           </a:xfrm>
           <a:prstGeom prst="rect">
             <a:avLst/>
@@ -3675,9 +4855,9 @@
               <a:rPr sz="1800">
                 <a:latin typeface="Courier"/>
               </a:rPr>
-              <a:t>ggplot(titanic, aes(x=pclass, fill=pclass)) +
-  geom_bar() +
-  scale_fill_manual(values=c("darkgrey", "darkgrey", "red"))</a:t>
+              <a:t>ggplot(titanic, aes(x=pclass)) +
+  geom_bar(aes(fill=pclass)) +
+  scale_fill_manual(values=c("#FF0000", "#808080", "#808080"))</a:t>
             </a:r>
           </a:p>
         </p:txBody>
@@ -3754,7 +4934,7 @@
           <p:nvPr/>
         </p:nvPicPr>
         <p:blipFill>
-          <a:blip r:embed="rId2"/>
+          <a:blip r:embed="rId3"/>
           <a:stretch>
             <a:fillRect/>
           </a:stretch>
@@ -3801,6 +4981,30 @@
             <a:r>
               <a:rPr/>
               <a:t>Barchart</a:t>
+            </a:r>
+            <a:r>
+              <a:rPr/>
+              <a:t> </a:t>
+            </a:r>
+            <a:r>
+              <a:rPr/>
+              <a:t>with</a:t>
+            </a:r>
+            <a:r>
+              <a:rPr/>
+              <a:t> </a:t>
+            </a:r>
+            <a:r>
+              <a:rPr/>
+              <a:t>red</a:t>
+            </a:r>
+            <a:r>
+              <a:rPr/>
+              <a:t> </a:t>
+            </a:r>
+            <a:r>
+              <a:rPr/>
+              <a:t>highlight</a:t>
             </a:r>
           </a:p>
         </p:txBody>
@@ -3868,27 +5072,86 @@
           </a:p>
         </p:txBody>
       </p:sp>
-      <p:sp>
-        <p:nvSpPr>
-          <p:cNvPr id="3" name="Content Placeholder 2"/>
-          <p:cNvSpPr>
-            <a:spLocks noGrp="1"/>
-          </p:cNvSpPr>
-          <p:nvPr>
-            <p:ph idx="1"/>
-          </p:nvPr>
-        </p:nvSpPr>
-        <p:spPr/>
-        <p:txBody>
-          <a:bodyPr/>
-          <a:lstStyle/>
-          <a:p>
-            <a:pPr lvl="0" marL="0" indent="0">
+      <p:pic>
+        <p:nvPicPr>
+          <p:cNvPr descr="../images/tableau/red-first-class.png" id="0" name="Picture 1"/>
+          <p:cNvPicPr>
+            <a:picLocks noGrp="1" noChangeAspect="1"/>
+          </p:cNvPicPr>
+          <p:nvPr/>
+        </p:nvPicPr>
+        <p:blipFill>
+          <a:blip r:embed="rId2"/>
+          <a:stretch>
+            <a:fillRect/>
+          </a:stretch>
+        </p:blipFill>
+        <p:spPr bwMode="auto">
+          <a:xfrm>
+            <a:off x="558800" y="1600200"/>
+            <a:ext cx="8026400" cy="4013200"/>
+          </a:xfrm>
+          <a:prstGeom prst="rect">
+            <a:avLst/>
+          </a:prstGeom>
+          <a:noFill/>
+          <a:ln w="9525">
+            <a:noFill/>
+            <a:headEnd/>
+            <a:tailEnd/>
+          </a:ln>
+        </p:spPr>
+      </p:pic>
+      <p:sp>
+        <p:nvSpPr>
+          <p:cNvPr id="1" name="TextBox 3"/>
+          <p:cNvSpPr txBox="1"/>
+          <p:nvPr/>
+        </p:nvSpPr>
+        <p:spPr>
+          <a:xfrm>
+            <a:off x="457200" y="5613400"/>
+            <a:ext cx="8229600" cy="508000"/>
+          </a:xfrm>
+          <a:prstGeom prst="rect">
+            <a:avLst/>
+          </a:prstGeom>
+          <a:noFill/>
+        </p:spPr>
+        <p:txBody>
+          <a:bodyPr/>
+          <a:lstStyle/>
+          <a:p>
+            <a:pPr lvl="0" marL="0" indent="0" algn="ctr">
               <a:buNone/>
             </a:pPr>
             <a:r>
               <a:rPr/>
-              <a:t>((Tableau results))</a:t>
+              <a:t>Barchart</a:t>
+            </a:r>
+            <a:r>
+              <a:rPr/>
+              <a:t> </a:t>
+            </a:r>
+            <a:r>
+              <a:rPr/>
+              <a:t>with</a:t>
+            </a:r>
+            <a:r>
+              <a:rPr/>
+              <a:t> </a:t>
+            </a:r>
+            <a:r>
+              <a:rPr/>
+              <a:t>red</a:t>
+            </a:r>
+            <a:r>
+              <a:rPr/>
+              <a:t> </a:t>
+            </a:r>
+            <a:r>
+              <a:rPr/>
+              <a:t>highlight</a:t>
             </a:r>
           </a:p>
         </p:txBody>
@@ -4216,4 +5479,265 @@
   </a:objectDefaults>
   <a:extraClrSchemeLst/>
 </a:theme>
+</file>
+
+<file path=ppt/theme/theme2.xml><?xml version="1.0" encoding="utf-8"?>
+<a:theme xmlns:a="http://schemas.openxmlformats.org/drawingml/2006/main" name="Office Theme">
+  <a:themeElements>
+    <a:clrScheme name="Office">
+      <a:dk1>
+        <a:sysClr val="windowText" lastClr="000000"/>
+      </a:dk1>
+      <a:lt1>
+        <a:sysClr val="window" lastClr="FFFFFF"/>
+      </a:lt1>
+      <a:dk2>
+        <a:srgbClr val="44546A"/>
+      </a:dk2>
+      <a:lt2>
+        <a:srgbClr val="E7E6E6"/>
+      </a:lt2>
+      <a:accent1>
+        <a:srgbClr val="5B9BD5"/>
+      </a:accent1>
+      <a:accent2>
+        <a:srgbClr val="ED7D31"/>
+      </a:accent2>
+      <a:accent3>
+        <a:srgbClr val="A5A5A5"/>
+      </a:accent3>
+      <a:accent4>
+        <a:srgbClr val="FFC000"/>
+      </a:accent4>
+      <a:accent5>
+        <a:srgbClr val="4472C4"/>
+      </a:accent5>
+      <a:accent6>
+        <a:srgbClr val="70AD47"/>
+      </a:accent6>
+      <a:hlink>
+        <a:srgbClr val="0563C1"/>
+      </a:hlink>
+      <a:folHlink>
+        <a:srgbClr val="954F72"/>
+      </a:folHlink>
+    </a:clrScheme>
+    <a:fontScheme name="Office">
+      <a:majorFont>
+        <a:latin typeface="Calibri Light" panose="020F0302020204030204"/>
+        <a:ea typeface=""/>
+        <a:cs typeface=""/>
+        <a:font script="Jpan" typeface="ＭＳ Ｐゴシック"/>
+        <a:font script="Hang" typeface="맑은 고딕"/>
+        <a:font script="Hans" typeface="宋体"/>
+        <a:font script="Hant" typeface="新細明體"/>
+        <a:font script="Arab" typeface="Times New Roman"/>
+        <a:font script="Hebr" typeface="Times New Roman"/>
+        <a:font script="Thai" typeface="Angsana New"/>
+        <a:font script="Ethi" typeface="Nyala"/>
+        <a:font script="Beng" typeface="Vrinda"/>
+        <a:font script="Gujr" typeface="Shruti"/>
+        <a:font script="Khmr" typeface="MoolBoran"/>
+        <a:font script="Knda" typeface="Tunga"/>
+        <a:font script="Guru" typeface="Raavi"/>
+        <a:font script="Cans" typeface="Euphemia"/>
+        <a:font script="Cher" typeface="Plantagenet Cherokee"/>
+        <a:font script="Yiii" typeface="Microsoft Yi Baiti"/>
+        <a:font script="Tibt" typeface="Microsoft Himalaya"/>
+        <a:font script="Thaa" typeface="MV Boli"/>
+        <a:font script="Deva" typeface="Mangal"/>
+        <a:font script="Telu" typeface="Gautami"/>
+        <a:font script="Taml" typeface="Latha"/>
+        <a:font script="Syrc" typeface="Estrangelo Edessa"/>
+        <a:font script="Orya" typeface="Kalinga"/>
+        <a:font script="Mlym" typeface="Kartika"/>
+        <a:font script="Laoo" typeface="DokChampa"/>
+        <a:font script="Sinh" typeface="Iskoola Pota"/>
+        <a:font script="Mong" typeface="Mongolian Baiti"/>
+        <a:font script="Viet" typeface="Times New Roman"/>
+        <a:font script="Uigh" typeface="Microsoft Uighur"/>
+        <a:font script="Geor" typeface="Sylfaen"/>
+      </a:majorFont>
+      <a:minorFont>
+        <a:latin typeface="Calibri" panose="020F0502020204030204"/>
+        <a:ea typeface=""/>
+        <a:cs typeface=""/>
+        <a:font script="Jpan" typeface="ＭＳ Ｐゴシック"/>
+        <a:font script="Hang" typeface="맑은 고딕"/>
+        <a:font script="Hans" typeface="宋体"/>
+        <a:font script="Hant" typeface="新細明體"/>
+        <a:font script="Arab" typeface="Arial"/>
+        <a:font script="Hebr" typeface="Arial"/>
+        <a:font script="Thai" typeface="Cordia New"/>
+        <a:font script="Ethi" typeface="Nyala"/>
+        <a:font script="Beng" typeface="Vrinda"/>
+        <a:font script="Gujr" typeface="Shruti"/>
+        <a:font script="Khmr" typeface="DaunPenh"/>
+        <a:font script="Knda" typeface="Tunga"/>
+        <a:font script="Guru" typeface="Raavi"/>
+        <a:font script="Cans" typeface="Euphemia"/>
+        <a:font script="Cher" typeface="Plantagenet Cherokee"/>
+        <a:font script="Yiii" typeface="Microsoft Yi Baiti"/>
+        <a:font script="Tibt" typeface="Microsoft Himalaya"/>
+        <a:font script="Thaa" typeface="MV Boli"/>
+        <a:font script="Deva" typeface="Mangal"/>
+        <a:font script="Telu" typeface="Gautami"/>
+        <a:font script="Taml" typeface="Latha"/>
+        <a:font script="Syrc" typeface="Estrangelo Edessa"/>
+        <a:font script="Orya" typeface="Kalinga"/>
+        <a:font script="Mlym" typeface="Kartika"/>
+        <a:font script="Laoo" typeface="DokChampa"/>
+        <a:font script="Sinh" typeface="Iskoola Pota"/>
+        <a:font script="Mong" typeface="Mongolian Baiti"/>
+        <a:font script="Viet" typeface="Arial"/>
+        <a:font script="Uigh" typeface="Microsoft Uighur"/>
+        <a:font script="Geor" typeface="Sylfaen"/>
+      </a:minorFont>
+    </a:fontScheme>
+    <a:fmtScheme name="Office">
+      <a:fillStyleLst>
+        <a:solidFill>
+          <a:schemeClr val="phClr"/>
+        </a:solidFill>
+        <a:gradFill rotWithShape="1">
+          <a:gsLst>
+            <a:gs pos="0">
+              <a:schemeClr val="phClr">
+                <a:lumMod val="110000"/>
+                <a:satMod val="105000"/>
+                <a:tint val="67000"/>
+              </a:schemeClr>
+            </a:gs>
+            <a:gs pos="50000">
+              <a:schemeClr val="phClr">
+                <a:lumMod val="105000"/>
+                <a:satMod val="103000"/>
+                <a:tint val="73000"/>
+              </a:schemeClr>
+            </a:gs>
+            <a:gs pos="100000">
+              <a:schemeClr val="phClr">
+                <a:lumMod val="105000"/>
+                <a:satMod val="109000"/>
+                <a:tint val="81000"/>
+              </a:schemeClr>
+            </a:gs>
+          </a:gsLst>
+          <a:lin ang="5400000" scaled="0"/>
+        </a:gradFill>
+        <a:gradFill rotWithShape="1">
+          <a:gsLst>
+            <a:gs pos="0">
+              <a:schemeClr val="phClr">
+                <a:satMod val="103000"/>
+                <a:lumMod val="102000"/>
+                <a:tint val="94000"/>
+              </a:schemeClr>
+            </a:gs>
+            <a:gs pos="50000">
+              <a:schemeClr val="phClr">
+                <a:satMod val="110000"/>
+                <a:lumMod val="100000"/>
+                <a:shade val="100000"/>
+              </a:schemeClr>
+            </a:gs>
+            <a:gs pos="100000">
+              <a:schemeClr val="phClr">
+                <a:lumMod val="99000"/>
+                <a:satMod val="120000"/>
+                <a:shade val="78000"/>
+              </a:schemeClr>
+            </a:gs>
+          </a:gsLst>
+          <a:lin ang="5400000" scaled="0"/>
+        </a:gradFill>
+      </a:fillStyleLst>
+      <a:lnStyleLst>
+        <a:ln w="6350" cap="flat" cmpd="sng" algn="ctr">
+          <a:solidFill>
+            <a:schemeClr val="phClr"/>
+          </a:solidFill>
+          <a:prstDash val="solid"/>
+          <a:miter lim="800000"/>
+        </a:ln>
+        <a:ln w="12700" cap="flat" cmpd="sng" algn="ctr">
+          <a:solidFill>
+            <a:schemeClr val="phClr"/>
+          </a:solidFill>
+          <a:prstDash val="solid"/>
+          <a:miter lim="800000"/>
+        </a:ln>
+        <a:ln w="19050" cap="flat" cmpd="sng" algn="ctr">
+          <a:solidFill>
+            <a:schemeClr val="phClr"/>
+          </a:solidFill>
+          <a:prstDash val="solid"/>
+          <a:miter lim="800000"/>
+        </a:ln>
+      </a:lnStyleLst>
+      <a:effectStyleLst>
+        <a:effectStyle>
+          <a:effectLst/>
+        </a:effectStyle>
+        <a:effectStyle>
+          <a:effectLst/>
+        </a:effectStyle>
+        <a:effectStyle>
+          <a:effectLst>
+            <a:outerShdw blurRad="57150" dist="19050" dir="5400000" algn="ctr" rotWithShape="0">
+              <a:srgbClr val="000000">
+                <a:alpha val="63000"/>
+              </a:srgbClr>
+            </a:outerShdw>
+          </a:effectLst>
+        </a:effectStyle>
+      </a:effectStyleLst>
+      <a:bgFillStyleLst>
+        <a:solidFill>
+          <a:schemeClr val="phClr"/>
+        </a:solidFill>
+        <a:solidFill>
+          <a:schemeClr val="phClr">
+            <a:tint val="95000"/>
+            <a:satMod val="170000"/>
+          </a:schemeClr>
+        </a:solidFill>
+        <a:gradFill rotWithShape="1">
+          <a:gsLst>
+            <a:gs pos="0">
+              <a:schemeClr val="phClr">
+                <a:tint val="93000"/>
+                <a:satMod val="150000"/>
+                <a:shade val="98000"/>
+                <a:lumMod val="102000"/>
+              </a:schemeClr>
+            </a:gs>
+            <a:gs pos="50000">
+              <a:schemeClr val="phClr">
+                <a:tint val="98000"/>
+                <a:satMod val="130000"/>
+                <a:shade val="90000"/>
+                <a:lumMod val="103000"/>
+              </a:schemeClr>
+            </a:gs>
+            <a:gs pos="100000">
+              <a:schemeClr val="phClr">
+                <a:shade val="63000"/>
+                <a:satMod val="120000"/>
+              </a:schemeClr>
+            </a:gs>
+          </a:gsLst>
+          <a:lin ang="5400000" scaled="0"/>
+        </a:gradFill>
+      </a:bgFillStyleLst>
+    </a:fmtScheme>
+  </a:themeElements>
+  <a:objectDefaults/>
+  <a:extraClrSchemeLst/>
+  <a:extLst>
+    <a:ext uri="{05A4C25C-085E-4340-85A3-A5531E510DB2}">
+      <thm15:themeFamily xmlns:thm15="http://schemas.microsoft.com/office/thememl/2012/main" name="Office Theme" id="{62F939B6-93AF-4DB8-9C6B-D6C7DFDC589F}" vid="{4A3C46E8-61CC-4603-A589-7422A47A8E4A}"/>
+    </a:ext>
+  </a:extLst>
+</a:theme>
 </file>
</xml_diff>